<commit_message>
today's log - match parent
</commit_message>
<xml_diff>
--- a/doc/plan/version 2 - design [Auto-saved].pptx
+++ b/doc/plan/version 2 - design [Auto-saved].pptx
@@ -2309,7 +2309,7 @@
           <a:p>
             <a:fld id="{1B6A1EFB-6C8C-4EE3-8FA3-17FA44E47B74}" type="datetimeFigureOut">
               <a:rPr lang="ko-KR" altLang="en-US" smtClean="0"/>
-              <a:t>2024-03-18</a:t>
+              <a:t>2024-03-24</a:t>
             </a:fld>
             <a:endParaRPr lang="ko-KR" altLang="en-US"/>
           </a:p>
@@ -2479,7 +2479,7 @@
           <a:p>
             <a:fld id="{1B6A1EFB-6C8C-4EE3-8FA3-17FA44E47B74}" type="datetimeFigureOut">
               <a:rPr lang="ko-KR" altLang="en-US" smtClean="0"/>
-              <a:t>2024-03-18</a:t>
+              <a:t>2024-03-24</a:t>
             </a:fld>
             <a:endParaRPr lang="ko-KR" altLang="en-US"/>
           </a:p>
@@ -2659,7 +2659,7 @@
           <a:p>
             <a:fld id="{1B6A1EFB-6C8C-4EE3-8FA3-17FA44E47B74}" type="datetimeFigureOut">
               <a:rPr lang="ko-KR" altLang="en-US" smtClean="0"/>
-              <a:t>2024-03-18</a:t>
+              <a:t>2024-03-24</a:t>
             </a:fld>
             <a:endParaRPr lang="ko-KR" altLang="en-US"/>
           </a:p>
@@ -2829,7 +2829,7 @@
           <a:p>
             <a:fld id="{1B6A1EFB-6C8C-4EE3-8FA3-17FA44E47B74}" type="datetimeFigureOut">
               <a:rPr lang="ko-KR" altLang="en-US" smtClean="0"/>
-              <a:t>2024-03-18</a:t>
+              <a:t>2024-03-24</a:t>
             </a:fld>
             <a:endParaRPr lang="ko-KR" altLang="en-US"/>
           </a:p>
@@ -3073,7 +3073,7 @@
           <a:p>
             <a:fld id="{1B6A1EFB-6C8C-4EE3-8FA3-17FA44E47B74}" type="datetimeFigureOut">
               <a:rPr lang="ko-KR" altLang="en-US" smtClean="0"/>
-              <a:t>2024-03-18</a:t>
+              <a:t>2024-03-24</a:t>
             </a:fld>
             <a:endParaRPr lang="ko-KR" altLang="en-US"/>
           </a:p>
@@ -3305,7 +3305,7 @@
           <a:p>
             <a:fld id="{1B6A1EFB-6C8C-4EE3-8FA3-17FA44E47B74}" type="datetimeFigureOut">
               <a:rPr lang="ko-KR" altLang="en-US" smtClean="0"/>
-              <a:t>2024-03-18</a:t>
+              <a:t>2024-03-24</a:t>
             </a:fld>
             <a:endParaRPr lang="ko-KR" altLang="en-US"/>
           </a:p>
@@ -3672,7 +3672,7 @@
           <a:p>
             <a:fld id="{1B6A1EFB-6C8C-4EE3-8FA3-17FA44E47B74}" type="datetimeFigureOut">
               <a:rPr lang="ko-KR" altLang="en-US" smtClean="0"/>
-              <a:t>2024-03-18</a:t>
+              <a:t>2024-03-24</a:t>
             </a:fld>
             <a:endParaRPr lang="ko-KR" altLang="en-US"/>
           </a:p>
@@ -3790,7 +3790,7 @@
           <a:p>
             <a:fld id="{1B6A1EFB-6C8C-4EE3-8FA3-17FA44E47B74}" type="datetimeFigureOut">
               <a:rPr lang="ko-KR" altLang="en-US" smtClean="0"/>
-              <a:t>2024-03-18</a:t>
+              <a:t>2024-03-24</a:t>
             </a:fld>
             <a:endParaRPr lang="ko-KR" altLang="en-US"/>
           </a:p>
@@ -3885,7 +3885,7 @@
           <a:p>
             <a:fld id="{1B6A1EFB-6C8C-4EE3-8FA3-17FA44E47B74}" type="datetimeFigureOut">
               <a:rPr lang="ko-KR" altLang="en-US" smtClean="0"/>
-              <a:t>2024-03-18</a:t>
+              <a:t>2024-03-24</a:t>
             </a:fld>
             <a:endParaRPr lang="ko-KR" altLang="en-US"/>
           </a:p>
@@ -4162,7 +4162,7 @@
           <a:p>
             <a:fld id="{1B6A1EFB-6C8C-4EE3-8FA3-17FA44E47B74}" type="datetimeFigureOut">
               <a:rPr lang="ko-KR" altLang="en-US" smtClean="0"/>
-              <a:t>2024-03-18</a:t>
+              <a:t>2024-03-24</a:t>
             </a:fld>
             <a:endParaRPr lang="ko-KR" altLang="en-US"/>
           </a:p>
@@ -4419,7 +4419,7 @@
           <a:p>
             <a:fld id="{1B6A1EFB-6C8C-4EE3-8FA3-17FA44E47B74}" type="datetimeFigureOut">
               <a:rPr lang="ko-KR" altLang="en-US" smtClean="0"/>
-              <a:t>2024-03-18</a:t>
+              <a:t>2024-03-24</a:t>
             </a:fld>
             <a:endParaRPr lang="ko-KR" altLang="en-US"/>
           </a:p>
@@ -4635,7 +4635,7 @@
           <a:p>
             <a:fld id="{1B6A1EFB-6C8C-4EE3-8FA3-17FA44E47B74}" type="datetimeFigureOut">
               <a:rPr lang="ko-KR" altLang="en-US" smtClean="0"/>
-              <a:t>2024-03-18</a:t>
+              <a:t>2024-03-24</a:t>
             </a:fld>
             <a:endParaRPr lang="ko-KR" altLang="en-US"/>
           </a:p>

</xml_diff>